<commit_message>
update layout dash 2
</commit_message>
<xml_diff>
--- a/documents/Arquivo 06.pptx
+++ b/documents/Arquivo 06.pptx
@@ -108,7 +108,97 @@
       </a:defRPr>
     </a:lvl9pPr>
   </p:defaultTextStyle>
+  <p:extLst>
+    <p:ext uri="{EFAFB233-063F-42B5-8137-9DF3F51BA10A}">
+      <p15:sldGuideLst xmlns:p15="http://schemas.microsoft.com/office/powerpoint/2012/main"/>
+    </p:ext>
+  </p:extLst>
 </p:presentation>
+</file>
+
+<file path=ppt/changesInfos/changesInfo1.xml><?xml version="1.0" encoding="utf-8"?>
+<pc:chgInfo xmlns:a="http://schemas.openxmlformats.org/drawingml/2006/main" xmlns:r="http://schemas.openxmlformats.org/officeDocument/2006/relationships" xmlns:ac="http://schemas.microsoft.com/office/drawing/2013/main/command" xmlns:pc="http://schemas.microsoft.com/office/powerpoint/2013/main/command">
+  <pc:docChgLst>
+    <pc:chgData name="emanuel quintino" userId="40cbc61c02823304" providerId="LiveId" clId="{DA3CF733-7EFF-4CB3-A33C-40FBF680AB72}"/>
+    <pc:docChg chg="undo custSel modSld">
+      <pc:chgData name="emanuel quintino" userId="40cbc61c02823304" providerId="LiveId" clId="{DA3CF733-7EFF-4CB3-A33C-40FBF680AB72}" dt="2024-01-15T22:25:14.436" v="40" actId="207"/>
+      <pc:docMkLst>
+        <pc:docMk/>
+      </pc:docMkLst>
+      <pc:sldChg chg="delSp modSp mod">
+        <pc:chgData name="emanuel quintino" userId="40cbc61c02823304" providerId="LiveId" clId="{DA3CF733-7EFF-4CB3-A33C-40FBF680AB72}" dt="2024-01-15T22:25:14.436" v="40" actId="207"/>
+        <pc:sldMkLst>
+          <pc:docMk/>
+          <pc:sldMk cId="4079212265" sldId="264"/>
+        </pc:sldMkLst>
+        <pc:spChg chg="mod">
+          <ac:chgData name="emanuel quintino" userId="40cbc61c02823304" providerId="LiveId" clId="{DA3CF733-7EFF-4CB3-A33C-40FBF680AB72}" dt="2024-01-15T22:20:38.972" v="9" actId="14100"/>
+          <ac:spMkLst>
+            <pc:docMk/>
+            <pc:sldMk cId="4079212265" sldId="264"/>
+            <ac:spMk id="6" creationId="{80785D0F-E574-49B3-AE34-C35B952F4C06}"/>
+          </ac:spMkLst>
+        </pc:spChg>
+        <pc:spChg chg="mod">
+          <ac:chgData name="emanuel quintino" userId="40cbc61c02823304" providerId="LiveId" clId="{DA3CF733-7EFF-4CB3-A33C-40FBF680AB72}" dt="2024-01-15T22:15:56.525" v="3" actId="20577"/>
+          <ac:spMkLst>
+            <pc:docMk/>
+            <pc:sldMk cId="4079212265" sldId="264"/>
+            <ac:spMk id="11" creationId="{E557DDEF-85A7-4349-A76A-EC6D0F324F14}"/>
+          </ac:spMkLst>
+        </pc:spChg>
+        <pc:spChg chg="del">
+          <ac:chgData name="emanuel quintino" userId="40cbc61c02823304" providerId="LiveId" clId="{DA3CF733-7EFF-4CB3-A33C-40FBF680AB72}" dt="2024-01-15T22:20:29.751" v="7" actId="478"/>
+          <ac:spMkLst>
+            <pc:docMk/>
+            <pc:sldMk cId="4079212265" sldId="264"/>
+            <ac:spMk id="14" creationId="{16D4625F-2E66-4AAE-BC85-D7F2EA49063C}"/>
+          </ac:spMkLst>
+        </pc:spChg>
+        <pc:spChg chg="mod">
+          <ac:chgData name="emanuel quintino" userId="40cbc61c02823304" providerId="LiveId" clId="{DA3CF733-7EFF-4CB3-A33C-40FBF680AB72}" dt="2024-01-15T22:24:58.225" v="39" actId="207"/>
+          <ac:spMkLst>
+            <pc:docMk/>
+            <pc:sldMk cId="4079212265" sldId="264"/>
+            <ac:spMk id="33" creationId="{D7FA6596-CFB0-45A4-A676-375D209C162E}"/>
+          </ac:spMkLst>
+        </pc:spChg>
+        <pc:spChg chg="mod">
+          <ac:chgData name="emanuel quintino" userId="40cbc61c02823304" providerId="LiveId" clId="{DA3CF733-7EFF-4CB3-A33C-40FBF680AB72}" dt="2024-01-15T22:25:14.436" v="40" actId="207"/>
+          <ac:spMkLst>
+            <pc:docMk/>
+            <pc:sldMk cId="4079212265" sldId="264"/>
+            <ac:spMk id="34" creationId="{F153AB1C-8C2B-456F-902C-BF2E2CE9D1EB}"/>
+          </ac:spMkLst>
+        </pc:spChg>
+        <pc:spChg chg="mod">
+          <ac:chgData name="emanuel quintino" userId="40cbc61c02823304" providerId="LiveId" clId="{DA3CF733-7EFF-4CB3-A33C-40FBF680AB72}" dt="2024-01-15T22:21:18.404" v="34" actId="14100"/>
+          <ac:spMkLst>
+            <pc:docMk/>
+            <pc:sldMk cId="4079212265" sldId="264"/>
+            <ac:spMk id="46" creationId="{B789F741-B776-4F9E-A5F2-54E4AA469238}"/>
+          </ac:spMkLst>
+        </pc:spChg>
+        <pc:spChg chg="del">
+          <ac:chgData name="emanuel quintino" userId="40cbc61c02823304" providerId="LiveId" clId="{DA3CF733-7EFF-4CB3-A33C-40FBF680AB72}" dt="2024-01-15T22:20:31.827" v="8" actId="478"/>
+          <ac:spMkLst>
+            <pc:docMk/>
+            <pc:sldMk cId="4079212265" sldId="264"/>
+            <ac:spMk id="48" creationId="{88FF6C0A-71D7-4143-A401-0BB141EF4DCE}"/>
+          </ac:spMkLst>
+        </pc:spChg>
+        <pc:grpChg chg="mod">
+          <ac:chgData name="emanuel quintino" userId="40cbc61c02823304" providerId="LiveId" clId="{DA3CF733-7EFF-4CB3-A33C-40FBF680AB72}" dt="2024-01-15T22:16:08.545" v="6" actId="1076"/>
+          <ac:grpSpMkLst>
+            <pc:docMk/>
+            <pc:sldMk cId="4079212265" sldId="264"/>
+            <ac:grpSpMk id="26" creationId="{A543D911-ECF6-4F13-B12F-9F6412904B2C}"/>
+          </ac:grpSpMkLst>
+        </pc:grpChg>
+      </pc:sldChg>
+    </pc:docChg>
+  </pc:docChgLst>
+</pc:chgInfo>
 </file>
 
 <file path=ppt/slideLayouts/slideLayout1.xml><?xml version="1.0" encoding="utf-8"?>
@@ -258,7 +348,7 @@
           <a:p>
             <a:fld id="{3428478C-F902-4FA1-9D59-6F779A5C6648}" type="datetimeFigureOut">
               <a:rPr lang="pt-BR" smtClean="0"/>
-              <a:t>03/08/2020</a:t>
+              <a:t>15/01/2024</a:t>
             </a:fld>
             <a:endParaRPr lang="pt-BR"/>
           </a:p>
@@ -456,7 +546,7 @@
           <a:p>
             <a:fld id="{3428478C-F902-4FA1-9D59-6F779A5C6648}" type="datetimeFigureOut">
               <a:rPr lang="pt-BR" smtClean="0"/>
-              <a:t>03/08/2020</a:t>
+              <a:t>15/01/2024</a:t>
             </a:fld>
             <a:endParaRPr lang="pt-BR"/>
           </a:p>
@@ -664,7 +754,7 @@
           <a:p>
             <a:fld id="{3428478C-F902-4FA1-9D59-6F779A5C6648}" type="datetimeFigureOut">
               <a:rPr lang="pt-BR" smtClean="0"/>
-              <a:t>03/08/2020</a:t>
+              <a:t>15/01/2024</a:t>
             </a:fld>
             <a:endParaRPr lang="pt-BR"/>
           </a:p>
@@ -862,7 +952,7 @@
           <a:p>
             <a:fld id="{3428478C-F902-4FA1-9D59-6F779A5C6648}" type="datetimeFigureOut">
               <a:rPr lang="pt-BR" smtClean="0"/>
-              <a:t>03/08/2020</a:t>
+              <a:t>15/01/2024</a:t>
             </a:fld>
             <a:endParaRPr lang="pt-BR"/>
           </a:p>
@@ -1137,7 +1227,7 @@
           <a:p>
             <a:fld id="{3428478C-F902-4FA1-9D59-6F779A5C6648}" type="datetimeFigureOut">
               <a:rPr lang="pt-BR" smtClean="0"/>
-              <a:t>03/08/2020</a:t>
+              <a:t>15/01/2024</a:t>
             </a:fld>
             <a:endParaRPr lang="pt-BR"/>
           </a:p>
@@ -1402,7 +1492,7 @@
           <a:p>
             <a:fld id="{3428478C-F902-4FA1-9D59-6F779A5C6648}" type="datetimeFigureOut">
               <a:rPr lang="pt-BR" smtClean="0"/>
-              <a:t>03/08/2020</a:t>
+              <a:t>15/01/2024</a:t>
             </a:fld>
             <a:endParaRPr lang="pt-BR"/>
           </a:p>
@@ -1814,7 +1904,7 @@
           <a:p>
             <a:fld id="{3428478C-F902-4FA1-9D59-6F779A5C6648}" type="datetimeFigureOut">
               <a:rPr lang="pt-BR" smtClean="0"/>
-              <a:t>03/08/2020</a:t>
+              <a:t>15/01/2024</a:t>
             </a:fld>
             <a:endParaRPr lang="pt-BR"/>
           </a:p>
@@ -1955,7 +2045,7 @@
           <a:p>
             <a:fld id="{3428478C-F902-4FA1-9D59-6F779A5C6648}" type="datetimeFigureOut">
               <a:rPr lang="pt-BR" smtClean="0"/>
-              <a:t>03/08/2020</a:t>
+              <a:t>15/01/2024</a:t>
             </a:fld>
             <a:endParaRPr lang="pt-BR"/>
           </a:p>
@@ -2068,7 +2158,7 @@
           <a:p>
             <a:fld id="{3428478C-F902-4FA1-9D59-6F779A5C6648}" type="datetimeFigureOut">
               <a:rPr lang="pt-BR" smtClean="0"/>
-              <a:t>03/08/2020</a:t>
+              <a:t>15/01/2024</a:t>
             </a:fld>
             <a:endParaRPr lang="pt-BR"/>
           </a:p>
@@ -2379,7 +2469,7 @@
           <a:p>
             <a:fld id="{3428478C-F902-4FA1-9D59-6F779A5C6648}" type="datetimeFigureOut">
               <a:rPr lang="pt-BR" smtClean="0"/>
-              <a:t>03/08/2020</a:t>
+              <a:t>15/01/2024</a:t>
             </a:fld>
             <a:endParaRPr lang="pt-BR"/>
           </a:p>
@@ -2667,7 +2757,7 @@
           <a:p>
             <a:fld id="{3428478C-F902-4FA1-9D59-6F779A5C6648}" type="datetimeFigureOut">
               <a:rPr lang="pt-BR" smtClean="0"/>
-              <a:t>03/08/2020</a:t>
+              <a:t>15/01/2024</a:t>
             </a:fld>
             <a:endParaRPr lang="pt-BR"/>
           </a:p>
@@ -2908,7 +2998,7 @@
           <a:p>
             <a:fld id="{3428478C-F902-4FA1-9D59-6F779A5C6648}" type="datetimeFigureOut">
               <a:rPr lang="pt-BR" smtClean="0"/>
-              <a:t>03/08/2020</a:t>
+              <a:t>15/01/2024</a:t>
             </a:fld>
             <a:endParaRPr lang="pt-BR"/>
           </a:p>
@@ -3431,8 +3521,8 @@
         </p:nvSpPr>
         <p:spPr>
           <a:xfrm>
-            <a:off x="5320937" y="4719885"/>
-            <a:ext cx="6635472" cy="1968042"/>
+            <a:off x="1983910" y="4719885"/>
+            <a:ext cx="9972499" cy="1968042"/>
           </a:xfrm>
           <a:prstGeom prst="rect">
             <a:avLst/>
@@ -3526,62 +3616,6 @@
           <a:p>
             <a:pPr algn="ctr"/>
             <a:endParaRPr lang="pt-BR"/>
-          </a:p>
-        </p:txBody>
-      </p:sp>
-      <p:sp>
-        <p:nvSpPr>
-          <p:cNvPr id="14" name="Retângulo 13">
-            <a:extLst>
-              <a:ext uri="{FF2B5EF4-FFF2-40B4-BE49-F238E27FC236}">
-                <a16:creationId xmlns:a16="http://schemas.microsoft.com/office/drawing/2014/main" id="{16D4625F-2E66-4AAE-BC85-D7F2EA49063C}"/>
-              </a:ext>
-            </a:extLst>
-          </p:cNvPr>
-          <p:cNvSpPr/>
-          <p:nvPr/>
-        </p:nvSpPr>
-        <p:spPr>
-          <a:xfrm>
-            <a:off x="1983910" y="4725927"/>
-            <a:ext cx="3258000" cy="1962000"/>
-          </a:xfrm>
-          <a:prstGeom prst="rect">
-            <a:avLst/>
-          </a:prstGeom>
-          <a:solidFill>
-            <a:schemeClr val="bg1">
-              <a:alpha val="13000"/>
-            </a:schemeClr>
-          </a:solidFill>
-          <a:ln w="19050">
-            <a:solidFill>
-              <a:schemeClr val="bg1"/>
-            </a:solidFill>
-          </a:ln>
-        </p:spPr>
-        <p:style>
-          <a:lnRef idx="2">
-            <a:schemeClr val="accent1">
-              <a:shade val="50000"/>
-            </a:schemeClr>
-          </a:lnRef>
-          <a:fillRef idx="1">
-            <a:schemeClr val="accent1"/>
-          </a:fillRef>
-          <a:effectRef idx="0">
-            <a:schemeClr val="accent1"/>
-          </a:effectRef>
-          <a:fontRef idx="minor">
-            <a:schemeClr val="lt1"/>
-          </a:fontRef>
-        </p:style>
-        <p:txBody>
-          <a:bodyPr rtlCol="0" anchor="ctr"/>
-          <a:lstStyle/>
-          <a:p>
-            <a:pPr algn="ctr"/>
-            <a:endParaRPr lang="pt-BR" dirty="0"/>
           </a:p>
         </p:txBody>
       </p:sp>
@@ -3712,7 +3746,7 @@
         </p:nvGrpSpPr>
         <p:grpSpPr>
           <a:xfrm>
-            <a:off x="178092" y="96732"/>
+            <a:off x="205524" y="-113765"/>
             <a:ext cx="2008396" cy="897241"/>
             <a:chOff x="178092" y="96732"/>
             <a:chExt cx="2008396" cy="897241"/>
@@ -3922,24 +3956,6 @@
               </a:bodyPr>
               <a:lstStyle/>
               <a:p>
-                <a:r>
-                  <a:rPr lang="pt-BR" dirty="0">
-                    <a:solidFill>
-                      <a:schemeClr val="bg1"/>
-                    </a:solidFill>
-                    <a:latin typeface="Montserrat" panose="02000505000000020004" pitchFamily="2" charset="0"/>
-                  </a:rPr>
-                  <a:t>JVS </a:t>
-                </a:r>
-                <a:r>
-                  <a:rPr lang="pt-BR" dirty="0" err="1">
-                    <a:solidFill>
-                      <a:schemeClr val="bg1"/>
-                    </a:solidFill>
-                    <a:latin typeface="Montserrat" panose="02000505000000020004" pitchFamily="2" charset="0"/>
-                  </a:rPr>
-                  <a:t>Group</a:t>
-                </a:r>
                 <a:endParaRPr lang="pt-BR" dirty="0">
                   <a:solidFill>
                     <a:schemeClr val="bg1"/>
@@ -4223,7 +4239,7 @@
             <a:avLst/>
           </a:prstGeom>
           <a:solidFill>
-            <a:schemeClr val="bg1"/>
+            <a:srgbClr val="FF6D9A"/>
           </a:solidFill>
         </p:spPr>
         <p:style>
@@ -4247,7 +4263,11 @@
           <a:lstStyle/>
           <a:p>
             <a:pPr algn="ctr"/>
-            <a:endParaRPr lang="pt-BR"/>
+            <a:endParaRPr lang="pt-BR" dirty="0">
+              <a:highlight>
+                <a:srgbClr val="800080"/>
+              </a:highlight>
+            </a:endParaRPr>
           </a:p>
         </p:txBody>
       </p:sp>
@@ -4272,7 +4292,7 @@
             <a:avLst/>
           </a:prstGeom>
           <a:solidFill>
-            <a:schemeClr val="bg1"/>
+            <a:srgbClr val="FFFF6D"/>
           </a:solidFill>
         </p:spPr>
         <p:style>
@@ -4513,57 +4533,8 @@
         </p:nvSpPr>
         <p:spPr>
           <a:xfrm rot="5400000">
-            <a:off x="8584626" y="1476521"/>
-            <a:ext cx="90664" cy="6595602"/>
-          </a:xfrm>
-          <a:prstGeom prst="rect">
-            <a:avLst/>
-          </a:prstGeom>
-          <a:solidFill>
-            <a:schemeClr val="bg1"/>
-          </a:solidFill>
-        </p:spPr>
-        <p:style>
-          <a:lnRef idx="2">
-            <a:schemeClr val="accent1">
-              <a:shade val="50000"/>
-            </a:schemeClr>
-          </a:lnRef>
-          <a:fillRef idx="1">
-            <a:schemeClr val="accent1"/>
-          </a:fillRef>
-          <a:effectRef idx="0">
-            <a:schemeClr val="accent1"/>
-          </a:effectRef>
-          <a:fontRef idx="minor">
-            <a:schemeClr val="lt1"/>
-          </a:fontRef>
-        </p:style>
-        <p:txBody>
-          <a:bodyPr rtlCol="0" anchor="ctr"/>
-          <a:lstStyle/>
-          <a:p>
-            <a:pPr algn="ctr"/>
-            <a:endParaRPr lang="pt-BR"/>
-          </a:p>
-        </p:txBody>
-      </p:sp>
-      <p:sp>
-        <p:nvSpPr>
-          <p:cNvPr id="48" name="Retângulo 47">
-            <a:extLst>
-              <a:ext uri="{FF2B5EF4-FFF2-40B4-BE49-F238E27FC236}">
-                <a16:creationId xmlns:a16="http://schemas.microsoft.com/office/drawing/2014/main" id="{88FF6C0A-71D7-4143-A401-0BB141EF4DCE}"/>
-              </a:ext>
-            </a:extLst>
-          </p:cNvPr>
-          <p:cNvSpPr/>
-          <p:nvPr/>
-        </p:nvSpPr>
-        <p:spPr>
-          <a:xfrm rot="5400000">
-            <a:off x="3557736" y="3135767"/>
-            <a:ext cx="109773" cy="3257999"/>
+            <a:off x="6900898" y="-216649"/>
+            <a:ext cx="81222" cy="9972499"/>
           </a:xfrm>
           <a:prstGeom prst="rect">
             <a:avLst/>

</xml_diff>